<commit_message>
2022/05/13 ~ 2022/05/20 1. ZYNQ_interrupt範例
</commit_message>
<xml_diff>
--- a/DevelopmentLog/表面異物檢測實現於SoC.pptx
+++ b/DevelopmentLog/表面異物檢測實現於SoC.pptx
@@ -5,7 +5,7 @@
     <p:sldMasterId id="2147483660" r:id="rId1"/>
   </p:sldMasterIdLst>
   <p:notesMasterIdLst>
-    <p:notesMasterId r:id="rId19"/>
+    <p:notesMasterId r:id="rId20"/>
   </p:notesMasterIdLst>
   <p:sldIdLst>
     <p:sldId id="1269" r:id="rId2"/>
@@ -24,7 +24,8 @@
     <p:sldId id="1962" r:id="rId15"/>
     <p:sldId id="1957" r:id="rId16"/>
     <p:sldId id="1961" r:id="rId17"/>
-    <p:sldId id="1959" r:id="rId18"/>
+    <p:sldId id="2059" r:id="rId18"/>
+    <p:sldId id="1959" r:id="rId19"/>
   </p:sldIdLst>
   <p:sldSz cx="12192000" cy="6858000"/>
   <p:notesSz cx="6858000" cy="9144000"/>
@@ -164,6 +165,7 @@
         <p14:section name="控管紀錄" id="{5F0ACE56-EC48-4A27-9699-A117B5CE528C}">
           <p14:sldIdLst>
             <p14:sldId id="1961"/>
+            <p14:sldId id="2059"/>
           </p14:sldIdLst>
         </p14:section>
         <p14:section name="參考資料" id="{BA9598D0-3A04-4F48-90BF-3803C175D302}">
@@ -795,7 +797,7 @@
                 <a:tabLst/>
                 <a:defRPr/>
               </a:pPr>
-              <a:t>17</a:t>
+              <a:t>18</a:t>
             </a:fld>
             <a:endParaRPr kumimoji="0" lang="zh-TW" altLang="en-US" sz="1200" b="0" i="0" u="none" strike="noStrike" kern="1200" cap="none" spc="0" normalizeH="0" baseline="0" noProof="0">
               <a:ln>
@@ -10897,6 +10899,120 @@
 </file>
 
 <file path=ppt/slides/slide17.xml><?xml version="1.0" encoding="utf-8"?>
+<p:sld xmlns:a="http://schemas.openxmlformats.org/drawingml/2006/main" xmlns:r="http://schemas.openxmlformats.org/officeDocument/2006/relationships" xmlns:p="http://schemas.openxmlformats.org/presentationml/2006/main">
+  <p:cSld>
+    <p:spTree>
+      <p:nvGrpSpPr>
+        <p:cNvPr id="1" name=""/>
+        <p:cNvGrpSpPr/>
+        <p:nvPr/>
+      </p:nvGrpSpPr>
+      <p:grpSpPr>
+        <a:xfrm>
+          <a:off x="0" y="0"/>
+          <a:ext cx="0" cy="0"/>
+          <a:chOff x="0" y="0"/>
+          <a:chExt cx="0" cy="0"/>
+        </a:xfrm>
+      </p:grpSpPr>
+      <p:sp>
+        <p:nvSpPr>
+          <p:cNvPr id="3" name="標題 2">
+            <a:extLst>
+              <a:ext uri="{FF2B5EF4-FFF2-40B4-BE49-F238E27FC236}">
+                <a16:creationId xmlns:a16="http://schemas.microsoft.com/office/drawing/2014/main" id="{28E497ED-1C46-4A74-9B27-D59C97969BB9}"/>
+              </a:ext>
+            </a:extLst>
+          </p:cNvPr>
+          <p:cNvSpPr>
+            <a:spLocks noGrp="1"/>
+          </p:cNvSpPr>
+          <p:nvPr>
+            <p:ph type="title"/>
+          </p:nvPr>
+        </p:nvSpPr>
+        <p:spPr/>
+        <p:txBody>
+          <a:bodyPr>
+            <a:normAutofit/>
+          </a:bodyPr>
+          <a:lstStyle/>
+          <a:p>
+            <a:r>
+              <a:rPr lang="en-US" altLang="zh-TW" dirty="0">
+                <a:solidFill>
+                  <a:prstClr val="black"/>
+                </a:solidFill>
+                <a:latin typeface="微軟正黑體" panose="020B0604030504040204" pitchFamily="34" charset="-120"/>
+                <a:ea typeface="微軟正黑體" panose="020B0604030504040204" pitchFamily="34" charset="-120"/>
+              </a:rPr>
+              <a:t>2022/05/06 ~ 2022/05/13</a:t>
+            </a:r>
+            <a:r>
+              <a:rPr lang="zh-TW" altLang="en-US">
+                <a:solidFill>
+                  <a:prstClr val="black"/>
+                </a:solidFill>
+                <a:latin typeface="微軟正黑體" panose="020B0604030504040204" pitchFamily="34" charset="-120"/>
+                <a:ea typeface="微軟正黑體" panose="020B0604030504040204" pitchFamily="34" charset="-120"/>
+              </a:rPr>
+              <a:t> </a:t>
+            </a:r>
+            <a:r>
+              <a:rPr lang="zh-TW" altLang="en-US"/>
+              <a:t>控</a:t>
+            </a:r>
+            <a:r>
+              <a:rPr lang="zh-TW" altLang="en-US" dirty="0"/>
+              <a:t>管紀錄</a:t>
+            </a:r>
+          </a:p>
+        </p:txBody>
+      </p:sp>
+      <p:pic>
+        <p:nvPicPr>
+          <p:cNvPr id="4" name="圖片 3">
+            <a:extLst>
+              <a:ext uri="{FF2B5EF4-FFF2-40B4-BE49-F238E27FC236}">
+                <a16:creationId xmlns:a16="http://schemas.microsoft.com/office/drawing/2014/main" id="{B4C550B8-405D-4068-8AB2-151269D500A4}"/>
+              </a:ext>
+            </a:extLst>
+          </p:cNvPr>
+          <p:cNvPicPr>
+            <a:picLocks noChangeAspect="1"/>
+          </p:cNvPicPr>
+          <p:nvPr/>
+        </p:nvPicPr>
+        <p:blipFill>
+          <a:blip r:embed="rId2"/>
+          <a:stretch>
+            <a:fillRect/>
+          </a:stretch>
+        </p:blipFill>
+        <p:spPr>
+          <a:xfrm>
+            <a:off x="0" y="2403212"/>
+            <a:ext cx="12192000" cy="2051576"/>
+          </a:xfrm>
+          <a:prstGeom prst="rect">
+            <a:avLst/>
+          </a:prstGeom>
+        </p:spPr>
+      </p:pic>
+    </p:spTree>
+    <p:extLst>
+      <p:ext uri="{BB962C8B-B14F-4D97-AF65-F5344CB8AC3E}">
+        <p14:creationId xmlns:p14="http://schemas.microsoft.com/office/powerpoint/2010/main" val="4173239502"/>
+      </p:ext>
+    </p:extLst>
+  </p:cSld>
+  <p:clrMapOvr>
+    <a:masterClrMapping/>
+  </p:clrMapOvr>
+</p:sld>
+</file>
+
+<file path=ppt/slides/slide18.xml><?xml version="1.0" encoding="utf-8"?>
 <p:sld xmlns:a="http://schemas.openxmlformats.org/drawingml/2006/main" xmlns:r="http://schemas.openxmlformats.org/officeDocument/2006/relationships" xmlns:p="http://schemas.openxmlformats.org/presentationml/2006/main">
   <p:cSld>
     <p:spTree>

</xml_diff>